<commit_message>
Add banner for event-us
</commit_message>
<xml_diff>
--- a/assets/assets.pptx
+++ b/assets/assets.pptx
@@ -6,6 +6,7 @@
   </p:sldMasterIdLst>
   <p:sldIdLst>
     <p:sldId id="256" r:id="rId2"/>
+    <p:sldId id="257" r:id="rId3"/>
   </p:sldIdLst>
   <p:sldSz cx="12192000" cy="6858000"/>
   <p:notesSz cx="6858000" cy="9144000"/>
@@ -104,6 +105,11 @@
       </a:defRPr>
     </a:lvl9pPr>
   </p:defaultTextStyle>
+  <p:extLst>
+    <p:ext uri="{EFAFB233-063F-42B5-8137-9DF3F51BA10A}">
+      <p15:sldGuideLst xmlns:p15="http://schemas.microsoft.com/office/powerpoint/2012/main"/>
+    </p:ext>
+  </p:extLst>
 </p:presentation>
 </file>
 
@@ -256,7 +262,7 @@
           <a:p>
             <a:fld id="{BB25D194-2EBD-934E-B9F1-F5BBA5573996}" type="datetimeFigureOut">
               <a:rPr lang="en-AU" smtClean="0"/>
-              <a:t>4/7/21</a:t>
+              <a:t>25/07/2022</a:t>
             </a:fld>
             <a:endParaRPr lang="en-AU"/>
           </a:p>
@@ -456,7 +462,7 @@
           <a:p>
             <a:fld id="{BB25D194-2EBD-934E-B9F1-F5BBA5573996}" type="datetimeFigureOut">
               <a:rPr lang="en-AU" smtClean="0"/>
-              <a:t>4/7/21</a:t>
+              <a:t>25/07/2022</a:t>
             </a:fld>
             <a:endParaRPr lang="en-AU"/>
           </a:p>
@@ -666,7 +672,7 @@
           <a:p>
             <a:fld id="{BB25D194-2EBD-934E-B9F1-F5BBA5573996}" type="datetimeFigureOut">
               <a:rPr lang="en-AU" smtClean="0"/>
-              <a:t>4/7/21</a:t>
+              <a:t>25/07/2022</a:t>
             </a:fld>
             <a:endParaRPr lang="en-AU"/>
           </a:p>
@@ -866,7 +872,7 @@
           <a:p>
             <a:fld id="{BB25D194-2EBD-934E-B9F1-F5BBA5573996}" type="datetimeFigureOut">
               <a:rPr lang="en-AU" smtClean="0"/>
-              <a:t>4/7/21</a:t>
+              <a:t>25/07/2022</a:t>
             </a:fld>
             <a:endParaRPr lang="en-AU"/>
           </a:p>
@@ -1142,7 +1148,7 @@
           <a:p>
             <a:fld id="{BB25D194-2EBD-934E-B9F1-F5BBA5573996}" type="datetimeFigureOut">
               <a:rPr lang="en-AU" smtClean="0"/>
-              <a:t>4/7/21</a:t>
+              <a:t>25/07/2022</a:t>
             </a:fld>
             <a:endParaRPr lang="en-AU"/>
           </a:p>
@@ -1410,7 +1416,7 @@
           <a:p>
             <a:fld id="{BB25D194-2EBD-934E-B9F1-F5BBA5573996}" type="datetimeFigureOut">
               <a:rPr lang="en-AU" smtClean="0"/>
-              <a:t>4/7/21</a:t>
+              <a:t>25/07/2022</a:t>
             </a:fld>
             <a:endParaRPr lang="en-AU"/>
           </a:p>
@@ -1825,7 +1831,7 @@
           <a:p>
             <a:fld id="{BB25D194-2EBD-934E-B9F1-F5BBA5573996}" type="datetimeFigureOut">
               <a:rPr lang="en-AU" smtClean="0"/>
-              <a:t>4/7/21</a:t>
+              <a:t>25/07/2022</a:t>
             </a:fld>
             <a:endParaRPr lang="en-AU"/>
           </a:p>
@@ -1967,7 +1973,7 @@
           <a:p>
             <a:fld id="{BB25D194-2EBD-934E-B9F1-F5BBA5573996}" type="datetimeFigureOut">
               <a:rPr lang="en-AU" smtClean="0"/>
-              <a:t>4/7/21</a:t>
+              <a:t>25/07/2022</a:t>
             </a:fld>
             <a:endParaRPr lang="en-AU"/>
           </a:p>
@@ -2080,7 +2086,7 @@
           <a:p>
             <a:fld id="{BB25D194-2EBD-934E-B9F1-F5BBA5573996}" type="datetimeFigureOut">
               <a:rPr lang="en-AU" smtClean="0"/>
-              <a:t>4/7/21</a:t>
+              <a:t>25/07/2022</a:t>
             </a:fld>
             <a:endParaRPr lang="en-AU"/>
           </a:p>
@@ -2393,7 +2399,7 @@
           <a:p>
             <a:fld id="{BB25D194-2EBD-934E-B9F1-F5BBA5573996}" type="datetimeFigureOut">
               <a:rPr lang="en-AU" smtClean="0"/>
-              <a:t>4/7/21</a:t>
+              <a:t>25/07/2022</a:t>
             </a:fld>
             <a:endParaRPr lang="en-AU"/>
           </a:p>
@@ -2682,7 +2688,7 @@
           <a:p>
             <a:fld id="{BB25D194-2EBD-934E-B9F1-F5BBA5573996}" type="datetimeFigureOut">
               <a:rPr lang="en-AU" smtClean="0"/>
-              <a:t>4/7/21</a:t>
+              <a:t>25/07/2022</a:t>
             </a:fld>
             <a:endParaRPr lang="en-AU"/>
           </a:p>
@@ -2925,7 +2931,7 @@
           <a:p>
             <a:fld id="{BB25D194-2EBD-934E-B9F1-F5BBA5573996}" type="datetimeFigureOut">
               <a:rPr lang="en-AU" smtClean="0"/>
-              <a:t>4/7/21</a:t>
+              <a:t>25/07/2022</a:t>
             </a:fld>
             <a:endParaRPr lang="en-AU"/>
           </a:p>
@@ -3450,6 +3456,136 @@
 </p:sld>
 </file>
 
+<file path=ppt/slides/slide2.xml><?xml version="1.0" encoding="utf-8"?>
+<p:sld xmlns:a="http://schemas.openxmlformats.org/drawingml/2006/main" xmlns:r="http://schemas.openxmlformats.org/officeDocument/2006/relationships" xmlns:p="http://schemas.openxmlformats.org/presentationml/2006/main">
+  <p:cSld>
+    <p:spTree>
+      <p:nvGrpSpPr>
+        <p:cNvPr id="1" name=""/>
+        <p:cNvGrpSpPr/>
+        <p:nvPr/>
+      </p:nvGrpSpPr>
+      <p:grpSpPr>
+        <a:xfrm>
+          <a:off x="0" y="0"/>
+          <a:ext cx="0" cy="0"/>
+          <a:chOff x="0" y="0"/>
+          <a:chExt cx="0" cy="0"/>
+        </a:xfrm>
+      </p:grpSpPr>
+      <p:grpSp>
+        <p:nvGrpSpPr>
+          <p:cNvPr id="8" name="Group 7">
+            <a:extLst>
+              <a:ext uri="{FF2B5EF4-FFF2-40B4-BE49-F238E27FC236}">
+                <a16:creationId xmlns:a16="http://schemas.microsoft.com/office/drawing/2014/main" id="{C9380D1D-C17A-ABCB-2876-BEAAFAE4D277}"/>
+              </a:ext>
+            </a:extLst>
+          </p:cNvPr>
+          <p:cNvGrpSpPr/>
+          <p:nvPr/>
+        </p:nvGrpSpPr>
+        <p:grpSpPr>
+          <a:xfrm>
+            <a:off x="568770" y="1989000"/>
+            <a:ext cx="11238261" cy="3288359"/>
+            <a:chOff x="713270" y="1989000"/>
+            <a:chExt cx="11238261" cy="3288359"/>
+          </a:xfrm>
+        </p:grpSpPr>
+        <p:pic>
+          <p:nvPicPr>
+            <p:cNvPr id="6" name="Picture 5" descr="Icon&#10;&#10;Description automatically generated">
+              <a:extLst>
+                <a:ext uri="{FF2B5EF4-FFF2-40B4-BE49-F238E27FC236}">
+                  <a16:creationId xmlns:a16="http://schemas.microsoft.com/office/drawing/2014/main" id="{230688FF-904E-89DE-6C62-CBF549EDCBA8}"/>
+                </a:ext>
+              </a:extLst>
+            </p:cNvPr>
+            <p:cNvPicPr>
+              <a:picLocks noChangeAspect="1"/>
+            </p:cNvPicPr>
+            <p:nvPr/>
+          </p:nvPicPr>
+          <p:blipFill>
+            <a:blip r:embed="rId2"/>
+            <a:stretch>
+              <a:fillRect/>
+            </a:stretch>
+          </p:blipFill>
+          <p:spPr>
+            <a:xfrm>
+              <a:off x="713270" y="1989000"/>
+              <a:ext cx="2880000" cy="2880000"/>
+            </a:xfrm>
+            <a:prstGeom prst="rect">
+              <a:avLst/>
+            </a:prstGeom>
+          </p:spPr>
+        </p:pic>
+        <p:sp>
+          <p:nvSpPr>
+            <p:cNvPr id="7" name="TextBox 6">
+              <a:extLst>
+                <a:ext uri="{FF2B5EF4-FFF2-40B4-BE49-F238E27FC236}">
+                  <a16:creationId xmlns:a16="http://schemas.microsoft.com/office/drawing/2014/main" id="{E94F4718-59FA-439C-F199-D2D09C0441A4}"/>
+                </a:ext>
+              </a:extLst>
+            </p:cNvPr>
+            <p:cNvSpPr txBox="1"/>
+            <p:nvPr/>
+          </p:nvSpPr>
+          <p:spPr>
+            <a:xfrm>
+              <a:off x="3593271" y="3184478"/>
+              <a:ext cx="8358260" cy="2092881"/>
+            </a:xfrm>
+            <a:prstGeom prst="rect">
+              <a:avLst/>
+            </a:prstGeom>
+            <a:noFill/>
+          </p:spPr>
+          <p:txBody>
+            <a:bodyPr wrap="square" rtlCol="0">
+              <a:spAutoFit/>
+            </a:bodyPr>
+            <a:lstStyle/>
+            <a:p>
+              <a:r>
+                <a:rPr lang="en-US" sz="13000" dirty="0" err="1">
+                  <a:solidFill>
+                    <a:srgbClr val="5B0077"/>
+                  </a:solidFill>
+                  <a:latin typeface="Consolas" panose="020B0609020204030204" pitchFamily="49" charset="0"/>
+                </a:rPr>
+                <a:t>usion</a:t>
+              </a:r>
+              <a:r>
+                <a:rPr lang="en-US" sz="13000" dirty="0">
+                  <a:solidFill>
+                    <a:srgbClr val="5B0077"/>
+                  </a:solidFill>
+                  <a:latin typeface="Consolas" panose="020B0609020204030204" pitchFamily="49" charset="0"/>
+                </a:rPr>
+                <a:t> Dev</a:t>
+              </a:r>
+            </a:p>
+          </p:txBody>
+        </p:sp>
+      </p:grpSp>
+    </p:spTree>
+    <p:extLst>
+      <p:ext uri="{BB962C8B-B14F-4D97-AF65-F5344CB8AC3E}">
+        <p14:creationId xmlns:p14="http://schemas.microsoft.com/office/powerpoint/2010/main" val="2363425770"/>
+      </p:ext>
+    </p:extLst>
+  </p:cSld>
+  <p:clrMapOvr>
+    <a:masterClrMapping/>
+  </p:clrMapOvr>
+</p:sld>
+</file>
+
 <file path=ppt/theme/theme1.xml><?xml version="1.0" encoding="utf-8"?>
 <a:theme xmlns:a="http://schemas.openxmlformats.org/drawingml/2006/main" name="Office Theme">
   <a:themeElements>

</xml_diff>